<commit_message>
update 9, add 11
</commit_message>
<xml_diff>
--- a/9. Objects/_9. Objects.pptx
+++ b/9. Objects/_9. Objects.pptx
@@ -3737,7 +3737,7 @@
         <p:spPr>
           <a:xfrm>
             <a:off x="452187" y="794082"/>
-            <a:ext cx="8411076" cy="5324535"/>
+            <a:ext cx="8411076" cy="5709255"/>
           </a:xfrm>
           <a:prstGeom prst="rect">
             <a:avLst/>
@@ -4167,6 +4167,33 @@
               </a:rPr>
               <a:t>	11. </a:t>
             </a:r>
+            <a:endParaRPr lang="en-US" sz="2000" dirty="0">
+              <a:effectLst/>
+              <a:latin typeface="Calibri" panose="020F0502020204030204" pitchFamily="34" charset="0"/>
+              <a:ea typeface="Calibri" panose="020F0502020204030204" pitchFamily="34" charset="0"/>
+              <a:cs typeface="Times New Roman" panose="02020603050405020304" pitchFamily="18" charset="0"/>
+            </a:endParaRPr>
+          </a:p>
+          <a:p>
+            <a:pPr>
+              <a:spcAft>
+                <a:spcPts val="600"/>
+              </a:spcAft>
+            </a:pPr>
+            <a:r>
+              <a:rPr lang="en-US" sz="2000" dirty="0">
+                <a:latin typeface="Calibri" panose="020F0502020204030204" pitchFamily="34" charset="0"/>
+                <a:ea typeface="Calibri" panose="020F0502020204030204" pitchFamily="34" charset="0"/>
+                <a:cs typeface="Times New Roman" panose="02020603050405020304" pitchFamily="18" charset="0"/>
+              </a:rPr>
+              <a:t>	12. </a:t>
+            </a:r>
+            <a:endParaRPr lang="ru-RU" sz="2000" dirty="0">
+              <a:effectLst/>
+              <a:latin typeface="Calibri" panose="020F0502020204030204" pitchFamily="34" charset="0"/>
+              <a:ea typeface="Calibri" panose="020F0502020204030204" pitchFamily="34" charset="0"/>
+              <a:cs typeface="Times New Roman" panose="02020603050405020304" pitchFamily="18" charset="0"/>
+            </a:endParaRPr>
           </a:p>
           <a:p>
             <a:pPr>
@@ -4181,7 +4208,25 @@
                 <a:ea typeface="Calibri" panose="020F0502020204030204" pitchFamily="34" charset="0"/>
                 <a:cs typeface="Times New Roman" panose="02020603050405020304" pitchFamily="18" charset="0"/>
               </a:rPr>
-              <a:t>	12. </a:t>
+              <a:t>	1</a:t>
+            </a:r>
+            <a:r>
+              <a:rPr lang="en-US" sz="2000" dirty="0">
+                <a:effectLst/>
+                <a:latin typeface="Calibri" panose="020F0502020204030204" pitchFamily="34" charset="0"/>
+                <a:ea typeface="Calibri" panose="020F0502020204030204" pitchFamily="34" charset="0"/>
+                <a:cs typeface="Times New Roman" panose="02020603050405020304" pitchFamily="18" charset="0"/>
+              </a:rPr>
+              <a:t>3</a:t>
+            </a:r>
+            <a:r>
+              <a:rPr lang="ru-RU" sz="2000" dirty="0">
+                <a:effectLst/>
+                <a:latin typeface="Calibri" panose="020F0502020204030204" pitchFamily="34" charset="0"/>
+                <a:ea typeface="Calibri" panose="020F0502020204030204" pitchFamily="34" charset="0"/>
+                <a:cs typeface="Times New Roman" panose="02020603050405020304" pitchFamily="18" charset="0"/>
+              </a:rPr>
+              <a:t>. </a:t>
             </a:r>
             <a:r>
               <a:rPr lang="ru-RU" sz="2000" dirty="0">

</xml_diff>

<commit_message>
old update of 9
</commit_message>
<xml_diff>
--- a/9. Objects/_9. Objects.pptx
+++ b/9. Objects/_9. Objects.pptx
@@ -198,7 +198,7 @@
           <a:p>
             <a:fld id="{7631E45C-F116-462B-8760-2078BF082F1A}" type="datetimeFigureOut">
               <a:rPr lang="ru-RU" smtClean="0"/>
-              <a:t>06.04.2023</a:t>
+              <a:t>20.04.2023</a:t>
             </a:fld>
             <a:endParaRPr lang="ru-RU"/>
           </a:p>
@@ -612,7 +612,7 @@
           <a:p>
             <a:fld id="{A9AD3FF1-1C77-4208-A728-6715B8BCAEC8}" type="datetime1">
               <a:rPr lang="ru-RU" smtClean="0"/>
-              <a:t>06.04.2023</a:t>
+              <a:t>20.04.2023</a:t>
             </a:fld>
             <a:endParaRPr lang="ru-RU"/>
           </a:p>
@@ -810,7 +810,7 @@
           <a:p>
             <a:fld id="{1C142B9A-2E56-4B99-A87C-1793C4E37C39}" type="datetime1">
               <a:rPr lang="ru-RU" smtClean="0"/>
-              <a:t>06.04.2023</a:t>
+              <a:t>20.04.2023</a:t>
             </a:fld>
             <a:endParaRPr lang="ru-RU"/>
           </a:p>
@@ -1018,7 +1018,7 @@
           <a:p>
             <a:fld id="{9E0ED007-B469-42B5-84D0-B2D8518EE6AF}" type="datetime1">
               <a:rPr lang="ru-RU" smtClean="0"/>
-              <a:t>06.04.2023</a:t>
+              <a:t>20.04.2023</a:t>
             </a:fld>
             <a:endParaRPr lang="ru-RU"/>
           </a:p>
@@ -1216,7 +1216,7 @@
           <a:p>
             <a:fld id="{C24A6B21-3CC2-4411-9ED7-28D4F07E6447}" type="datetime1">
               <a:rPr lang="ru-RU" smtClean="0"/>
-              <a:t>06.04.2023</a:t>
+              <a:t>20.04.2023</a:t>
             </a:fld>
             <a:endParaRPr lang="ru-RU"/>
           </a:p>
@@ -1491,7 +1491,7 @@
           <a:p>
             <a:fld id="{B56534DB-51AD-42E8-BAE2-9D524DF6969E}" type="datetime1">
               <a:rPr lang="ru-RU" smtClean="0"/>
-              <a:t>06.04.2023</a:t>
+              <a:t>20.04.2023</a:t>
             </a:fld>
             <a:endParaRPr lang="ru-RU"/>
           </a:p>
@@ -1756,7 +1756,7 @@
           <a:p>
             <a:fld id="{586E71E7-4231-4511-A286-4D8BAA3C5460}" type="datetime1">
               <a:rPr lang="ru-RU" smtClean="0"/>
-              <a:t>06.04.2023</a:t>
+              <a:t>20.04.2023</a:t>
             </a:fld>
             <a:endParaRPr lang="ru-RU"/>
           </a:p>
@@ -2168,7 +2168,7 @@
           <a:p>
             <a:fld id="{38907D2B-A495-4440-AD73-F377A1E57184}" type="datetime1">
               <a:rPr lang="ru-RU" smtClean="0"/>
-              <a:t>06.04.2023</a:t>
+              <a:t>20.04.2023</a:t>
             </a:fld>
             <a:endParaRPr lang="ru-RU"/>
           </a:p>
@@ -2309,7 +2309,7 @@
           <a:p>
             <a:fld id="{161FC52B-1D54-47AE-B2C9-575E5C19FE39}" type="datetime1">
               <a:rPr lang="ru-RU" smtClean="0"/>
-              <a:t>06.04.2023</a:t>
+              <a:t>20.04.2023</a:t>
             </a:fld>
             <a:endParaRPr lang="ru-RU"/>
           </a:p>
@@ -2422,7 +2422,7 @@
           <a:p>
             <a:fld id="{8832FC10-F7B7-4864-9033-3EC7976FDCB5}" type="datetime1">
               <a:rPr lang="ru-RU" smtClean="0"/>
-              <a:t>06.04.2023</a:t>
+              <a:t>20.04.2023</a:t>
             </a:fld>
             <a:endParaRPr lang="ru-RU"/>
           </a:p>
@@ -2733,7 +2733,7 @@
           <a:p>
             <a:fld id="{4C6FDB09-C334-42D1-A8CC-92BA43584AF5}" type="datetime1">
               <a:rPr lang="ru-RU" smtClean="0"/>
-              <a:t>06.04.2023</a:t>
+              <a:t>20.04.2023</a:t>
             </a:fld>
             <a:endParaRPr lang="ru-RU"/>
           </a:p>
@@ -3021,7 +3021,7 @@
           <a:p>
             <a:fld id="{5DA449B0-4AC4-4D56-AD1E-2E60E920D68F}" type="datetime1">
               <a:rPr lang="ru-RU" smtClean="0"/>
-              <a:t>06.04.2023</a:t>
+              <a:t>20.04.2023</a:t>
             </a:fld>
             <a:endParaRPr lang="ru-RU"/>
           </a:p>
@@ -3262,7 +3262,7 @@
           <a:p>
             <a:fld id="{6E39FA31-E67D-4DB0-8FD3-FD47DE2B0D1A}" type="datetime1">
               <a:rPr lang="ru-RU" smtClean="0"/>
-              <a:t>06.04.2023</a:t>
+              <a:t>20.04.2023</a:t>
             </a:fld>
             <a:endParaRPr lang="ru-RU"/>
           </a:p>
@@ -4134,23 +4134,8 @@
                 <a:ea typeface="Calibri" panose="020F0502020204030204" pitchFamily="34" charset="0"/>
                 <a:cs typeface="Times New Roman" panose="02020603050405020304" pitchFamily="18" charset="0"/>
               </a:rPr>
-              <a:t>	10. Чтение/запись файлов</a:t>
-            </a:r>
-            <a:r>
-              <a:rPr lang="en-US" sz="2000" dirty="0">
-                <a:effectLst/>
-                <a:latin typeface="Calibri" panose="020F0502020204030204" pitchFamily="34" charset="0"/>
-                <a:ea typeface="Calibri" panose="020F0502020204030204" pitchFamily="34" charset="0"/>
-                <a:cs typeface="Times New Roman" panose="02020603050405020304" pitchFamily="18" charset="0"/>
-              </a:rPr>
-              <a:t>.</a:t>
-            </a:r>
-            <a:endParaRPr lang="ru-RU" sz="2000" dirty="0">
-              <a:effectLst/>
-              <a:latin typeface="Calibri" panose="020F0502020204030204" pitchFamily="34" charset="0"/>
-              <a:ea typeface="Calibri" panose="020F0502020204030204" pitchFamily="34" charset="0"/>
-              <a:cs typeface="Times New Roman" panose="02020603050405020304" pitchFamily="18" charset="0"/>
-            </a:endParaRPr>
+              <a:t>	10. Практика по объектам.</a:t>
+            </a:r>
           </a:p>
           <a:p>
             <a:pPr>
@@ -4167,6 +4152,21 @@
               </a:rPr>
               <a:t>	11. </a:t>
             </a:r>
+            <a:r>
+              <a:rPr lang="ru-RU" sz="2000">
+                <a:effectLst/>
+                <a:latin typeface="Calibri" panose="020F0502020204030204" pitchFamily="34" charset="0"/>
+                <a:ea typeface="Calibri" panose="020F0502020204030204" pitchFamily="34" charset="0"/>
+                <a:cs typeface="Times New Roman" panose="02020603050405020304" pitchFamily="18" charset="0"/>
+              </a:rPr>
+              <a:t>Практика по объектам.</a:t>
+            </a:r>
+            <a:endParaRPr lang="ru-RU" sz="2000" dirty="0">
+              <a:effectLst/>
+              <a:latin typeface="Calibri" panose="020F0502020204030204" pitchFamily="34" charset="0"/>
+              <a:ea typeface="Calibri" panose="020F0502020204030204" pitchFamily="34" charset="0"/>
+              <a:cs typeface="Times New Roman" panose="02020603050405020304" pitchFamily="18" charset="0"/>
+            </a:endParaRPr>
           </a:p>
           <a:p>
             <a:pPr>

</xml_diff>